<commit_message>
modifying image for PhD job
</commit_message>
<xml_diff>
--- a/img/jobs/STScI-01GGWCWMSS7A7H3QTK55C5AD8R-mag.pptx
+++ b/img/jobs/STScI-01GGWCWMSS7A7H3QTK55C5AD8R-mag.pptx
@@ -3143,10 +3143,10 @@
       </p:pic>
       <p:grpSp>
         <p:nvGrpSpPr>
-          <p:cNvPr id="9" name="Groupe 8">
-            <a:extLst>
-              <a:ext uri="{FF2B5EF4-FFF2-40B4-BE49-F238E27FC236}">
-                <a16:creationId xmlns:a16="http://schemas.microsoft.com/office/drawing/2014/main" id="{84FEEE7D-C6F5-AB4F-BBB0-B88B14C44B90}"/>
+          <p:cNvPr id="14" name="Groupe 13">
+            <a:extLst>
+              <a:ext uri="{FF2B5EF4-FFF2-40B4-BE49-F238E27FC236}">
+                <a16:creationId xmlns:a16="http://schemas.microsoft.com/office/drawing/2014/main" id="{33E61CBE-EC69-2645-AE3C-4BCE82478467}"/>
               </a:ext>
             </a:extLst>
           </p:cNvPr>
@@ -3155,11 +3155,19 @@
         </p:nvGrpSpPr>
         <p:grpSpPr>
           <a:xfrm>
-            <a:off x="6469612" y="2914018"/>
+            <a:off x="6510556" y="2900370"/>
             <a:ext cx="486000" cy="1080000"/>
-            <a:chOff x="6415020" y="2914018"/>
+            <a:chOff x="6510556" y="2927666"/>
             <a:chExt cx="486000" cy="1080000"/>
           </a:xfrm>
+          <a:pattFill prst="lgConfetti">
+            <a:fgClr>
+              <a:srgbClr val="C00000"/>
+            </a:fgClr>
+            <a:bgClr>
+              <a:schemeClr val="bg1"/>
+            </a:bgClr>
+          </a:pattFill>
         </p:grpSpPr>
         <p:sp>
           <p:nvSpPr>
@@ -3176,8 +3184,8 @@
             <p:nvPr/>
           </p:nvSpPr>
           <p:spPr>
-            <a:xfrm rot="17082498">
-              <a:off x="6118020" y="3211018"/>
+            <a:xfrm rot="16815855">
+              <a:off x="6213556" y="3224666"/>
               <a:ext cx="1080000" cy="486000"/>
             </a:xfrm>
             <a:prstGeom prst="blockArc">
@@ -3187,9 +3195,7 @@
                 <a:gd name="adj3" fmla="val 10768"/>
               </a:avLst>
             </a:prstGeom>
-            <a:solidFill>
-              <a:schemeClr val="bg1"/>
-            </a:solidFill>
+            <a:grpFill/>
             <a:ln>
               <a:noFill/>
             </a:ln>
@@ -3238,8 +3244,8 @@
             <p:nvPr/>
           </p:nvSpPr>
           <p:spPr>
-            <a:xfrm rot="17082498">
-              <a:off x="6298019" y="3292018"/>
+            <a:xfrm rot="16815855">
+              <a:off x="6393555" y="3292018"/>
               <a:ext cx="720000" cy="324000"/>
             </a:xfrm>
             <a:prstGeom prst="blockArc">
@@ -3249,9 +3255,7 @@
                 <a:gd name="adj3" fmla="val 9627"/>
               </a:avLst>
             </a:prstGeom>
-            <a:solidFill>
-              <a:schemeClr val="bg1"/>
-            </a:solidFill>
+            <a:grpFill/>
             <a:ln>
               <a:noFill/>
             </a:ln>
@@ -3300,8 +3304,8 @@
             <p:nvPr/>
           </p:nvSpPr>
           <p:spPr>
-            <a:xfrm rot="665710">
-              <a:off x="6541966" y="3279021"/>
+            <a:xfrm rot="600000">
+              <a:off x="6637968" y="3281025"/>
               <a:ext cx="180000" cy="360000"/>
             </a:xfrm>
             <a:prstGeom prst="donut">
@@ -3309,9 +3313,7 @@
                 <a:gd name="adj" fmla="val 23122"/>
               </a:avLst>
             </a:prstGeom>
-            <a:solidFill>
-              <a:schemeClr val="bg1"/>
-            </a:solidFill>
+            <a:grpFill/>
             <a:ln>
               <a:noFill/>
             </a:ln>
@@ -3348,10 +3350,10 @@
       </p:grpSp>
       <p:grpSp>
         <p:nvGrpSpPr>
-          <p:cNvPr id="10" name="Groupe 9">
-            <a:extLst>
-              <a:ext uri="{FF2B5EF4-FFF2-40B4-BE49-F238E27FC236}">
-                <a16:creationId xmlns:a16="http://schemas.microsoft.com/office/drawing/2014/main" id="{F4B87510-93CC-D245-AE6E-4BF0526C791F}"/>
+          <p:cNvPr id="15" name="Groupe 14">
+            <a:extLst>
+              <a:ext uri="{FF2B5EF4-FFF2-40B4-BE49-F238E27FC236}">
+                <a16:creationId xmlns:a16="http://schemas.microsoft.com/office/drawing/2014/main" id="{926FC312-6FF5-3541-B23F-2045EFD87D7D}"/>
               </a:ext>
             </a:extLst>
           </p:cNvPr>
@@ -3360,18 +3362,26 @@
         </p:nvGrpSpPr>
         <p:grpSpPr>
           <a:xfrm rot="10800000">
-            <a:off x="5942622" y="2741870"/>
+            <a:off x="5978212" y="2784420"/>
             <a:ext cx="486000" cy="1080000"/>
-            <a:chOff x="6415020" y="2914018"/>
+            <a:chOff x="6510556" y="2927666"/>
             <a:chExt cx="486000" cy="1080000"/>
           </a:xfrm>
+          <a:pattFill prst="lgConfetti">
+            <a:fgClr>
+              <a:srgbClr val="C00000"/>
+            </a:fgClr>
+            <a:bgClr>
+              <a:schemeClr val="bg1"/>
+            </a:bgClr>
+          </a:pattFill>
         </p:grpSpPr>
         <p:sp>
           <p:nvSpPr>
-            <p:cNvPr id="11" name="Arc plein 10">
+            <p:cNvPr id="16" name="Arc plein 15">
               <a:extLst>
                 <a:ext uri="{FF2B5EF4-FFF2-40B4-BE49-F238E27FC236}">
-                  <a16:creationId xmlns:a16="http://schemas.microsoft.com/office/drawing/2014/main" id="{F5DAE1DB-D513-0C40-A58C-2450FFC4AAA5}"/>
+                  <a16:creationId xmlns:a16="http://schemas.microsoft.com/office/drawing/2014/main" id="{CE71E90E-B718-1045-BFCC-FF327CF4FCF6}"/>
                 </a:ext>
               </a:extLst>
             </p:cNvPr>
@@ -3381,8 +3391,8 @@
             <p:nvPr/>
           </p:nvSpPr>
           <p:spPr>
-            <a:xfrm rot="17082498">
-              <a:off x="6118020" y="3211018"/>
+            <a:xfrm rot="16815855">
+              <a:off x="6213556" y="3224666"/>
               <a:ext cx="1080000" cy="486000"/>
             </a:xfrm>
             <a:prstGeom prst="blockArc">
@@ -3392,9 +3402,7 @@
                 <a:gd name="adj3" fmla="val 10768"/>
               </a:avLst>
             </a:prstGeom>
-            <a:solidFill>
-              <a:schemeClr val="bg1"/>
-            </a:solidFill>
+            <a:grpFill/>
             <a:ln>
               <a:noFill/>
             </a:ln>
@@ -3430,10 +3438,10 @@
         </p:sp>
         <p:sp>
           <p:nvSpPr>
-            <p:cNvPr id="12" name="Arc plein 11">
+            <p:cNvPr id="17" name="Arc plein 16">
               <a:extLst>
                 <a:ext uri="{FF2B5EF4-FFF2-40B4-BE49-F238E27FC236}">
-                  <a16:creationId xmlns:a16="http://schemas.microsoft.com/office/drawing/2014/main" id="{FDE31FEF-A1F9-FC46-B263-3AF64273F331}"/>
+                  <a16:creationId xmlns:a16="http://schemas.microsoft.com/office/drawing/2014/main" id="{2CA01CFC-5D4A-4949-BB9A-A11041112833}"/>
                 </a:ext>
               </a:extLst>
             </p:cNvPr>
@@ -3443,8 +3451,8 @@
             <p:nvPr/>
           </p:nvSpPr>
           <p:spPr>
-            <a:xfrm rot="17082498">
-              <a:off x="6298019" y="3292018"/>
+            <a:xfrm rot="16815855">
+              <a:off x="6393555" y="3292018"/>
               <a:ext cx="720000" cy="324000"/>
             </a:xfrm>
             <a:prstGeom prst="blockArc">
@@ -3454,9 +3462,7 @@
                 <a:gd name="adj3" fmla="val 9627"/>
               </a:avLst>
             </a:prstGeom>
-            <a:solidFill>
-              <a:schemeClr val="bg1"/>
-            </a:solidFill>
+            <a:grpFill/>
             <a:ln>
               <a:noFill/>
             </a:ln>
@@ -3492,10 +3498,10 @@
         </p:sp>
         <p:sp>
           <p:nvSpPr>
-            <p:cNvPr id="13" name="Bouée 12">
+            <p:cNvPr id="18" name="Bouée 17">
               <a:extLst>
                 <a:ext uri="{FF2B5EF4-FFF2-40B4-BE49-F238E27FC236}">
-                  <a16:creationId xmlns:a16="http://schemas.microsoft.com/office/drawing/2014/main" id="{EF381B1A-0C09-6942-9F8D-33E4CAA25DF2}"/>
+                  <a16:creationId xmlns:a16="http://schemas.microsoft.com/office/drawing/2014/main" id="{B71B8B77-90DB-F947-9828-721CEA70CD8E}"/>
                 </a:ext>
               </a:extLst>
             </p:cNvPr>
@@ -3505,8 +3511,8 @@
             <p:nvPr/>
           </p:nvSpPr>
           <p:spPr>
-            <a:xfrm rot="665710">
-              <a:off x="6541966" y="3279021"/>
+            <a:xfrm rot="600000">
+              <a:off x="6637968" y="3281025"/>
               <a:ext cx="180000" cy="360000"/>
             </a:xfrm>
             <a:prstGeom prst="donut">
@@ -3514,9 +3520,7 @@
                 <a:gd name="adj" fmla="val 23122"/>
               </a:avLst>
             </a:prstGeom>
-            <a:solidFill>
-              <a:schemeClr val="bg1"/>
-            </a:solidFill>
+            <a:grpFill/>
             <a:ln>
               <a:noFill/>
             </a:ln>

</xml_diff>